<commit_message>
Actaulizacion de busqueda y suegrencias
</commit_message>
<xml_diff>
--- a/Documentacion/Aruitectura.pptx
+++ b/Documentacion/Aruitectura.pptx
@@ -6,6 +6,7 @@
   </p:sldMasterIdLst>
   <p:sldIdLst>
     <p:sldId id="256" r:id="rId2"/>
+    <p:sldId id="257" r:id="rId3"/>
   </p:sldIdLst>
   <p:sldSz cx="12192000" cy="6858000"/>
   <p:notesSz cx="6858000" cy="9144000"/>
@@ -104,6 +105,11 @@
       </a:defRPr>
     </a:lvl9pPr>
   </p:defaultTextStyle>
+  <p:extLst>
+    <p:ext uri="{EFAFB233-063F-42B5-8137-9DF3F51BA10A}">
+      <p15:sldGuideLst xmlns:p15="http://schemas.microsoft.com/office/powerpoint/2012/main"/>
+    </p:ext>
+  </p:extLst>
 </p:presentation>
 </file>
 
@@ -256,7 +262,7 @@
           <a:p>
             <a:fld id="{B0CA4D03-1BCB-4E51-9C66-DF5ED4B532F3}" type="datetimeFigureOut">
               <a:rPr lang="es-PE" smtClean="0"/>
-              <a:t>3/12/2019</a:t>
+              <a:t>20/12/2019</a:t>
             </a:fld>
             <a:endParaRPr lang="es-PE"/>
           </a:p>
@@ -456,7 +462,7 @@
           <a:p>
             <a:fld id="{B0CA4D03-1BCB-4E51-9C66-DF5ED4B532F3}" type="datetimeFigureOut">
               <a:rPr lang="es-PE" smtClean="0"/>
-              <a:t>3/12/2019</a:t>
+              <a:t>20/12/2019</a:t>
             </a:fld>
             <a:endParaRPr lang="es-PE"/>
           </a:p>
@@ -666,7 +672,7 @@
           <a:p>
             <a:fld id="{B0CA4D03-1BCB-4E51-9C66-DF5ED4B532F3}" type="datetimeFigureOut">
               <a:rPr lang="es-PE" smtClean="0"/>
-              <a:t>3/12/2019</a:t>
+              <a:t>20/12/2019</a:t>
             </a:fld>
             <a:endParaRPr lang="es-PE"/>
           </a:p>
@@ -866,7 +872,7 @@
           <a:p>
             <a:fld id="{B0CA4D03-1BCB-4E51-9C66-DF5ED4B532F3}" type="datetimeFigureOut">
               <a:rPr lang="es-PE" smtClean="0"/>
-              <a:t>3/12/2019</a:t>
+              <a:t>20/12/2019</a:t>
             </a:fld>
             <a:endParaRPr lang="es-PE"/>
           </a:p>
@@ -1142,7 +1148,7 @@
           <a:p>
             <a:fld id="{B0CA4D03-1BCB-4E51-9C66-DF5ED4B532F3}" type="datetimeFigureOut">
               <a:rPr lang="es-PE" smtClean="0"/>
-              <a:t>3/12/2019</a:t>
+              <a:t>20/12/2019</a:t>
             </a:fld>
             <a:endParaRPr lang="es-PE"/>
           </a:p>
@@ -1410,7 +1416,7 @@
           <a:p>
             <a:fld id="{B0CA4D03-1BCB-4E51-9C66-DF5ED4B532F3}" type="datetimeFigureOut">
               <a:rPr lang="es-PE" smtClean="0"/>
-              <a:t>3/12/2019</a:t>
+              <a:t>20/12/2019</a:t>
             </a:fld>
             <a:endParaRPr lang="es-PE"/>
           </a:p>
@@ -1825,7 +1831,7 @@
           <a:p>
             <a:fld id="{B0CA4D03-1BCB-4E51-9C66-DF5ED4B532F3}" type="datetimeFigureOut">
               <a:rPr lang="es-PE" smtClean="0"/>
-              <a:t>3/12/2019</a:t>
+              <a:t>20/12/2019</a:t>
             </a:fld>
             <a:endParaRPr lang="es-PE"/>
           </a:p>
@@ -1967,7 +1973,7 @@
           <a:p>
             <a:fld id="{B0CA4D03-1BCB-4E51-9C66-DF5ED4B532F3}" type="datetimeFigureOut">
               <a:rPr lang="es-PE" smtClean="0"/>
-              <a:t>3/12/2019</a:t>
+              <a:t>20/12/2019</a:t>
             </a:fld>
             <a:endParaRPr lang="es-PE"/>
           </a:p>
@@ -2080,7 +2086,7 @@
           <a:p>
             <a:fld id="{B0CA4D03-1BCB-4E51-9C66-DF5ED4B532F3}" type="datetimeFigureOut">
               <a:rPr lang="es-PE" smtClean="0"/>
-              <a:t>3/12/2019</a:t>
+              <a:t>20/12/2019</a:t>
             </a:fld>
             <a:endParaRPr lang="es-PE"/>
           </a:p>
@@ -2393,7 +2399,7 @@
           <a:p>
             <a:fld id="{B0CA4D03-1BCB-4E51-9C66-DF5ED4B532F3}" type="datetimeFigureOut">
               <a:rPr lang="es-PE" smtClean="0"/>
-              <a:t>3/12/2019</a:t>
+              <a:t>20/12/2019</a:t>
             </a:fld>
             <a:endParaRPr lang="es-PE"/>
           </a:p>
@@ -2682,7 +2688,7 @@
           <a:p>
             <a:fld id="{B0CA4D03-1BCB-4E51-9C66-DF5ED4B532F3}" type="datetimeFigureOut">
               <a:rPr lang="es-PE" smtClean="0"/>
-              <a:t>3/12/2019</a:t>
+              <a:t>20/12/2019</a:t>
             </a:fld>
             <a:endParaRPr lang="es-PE"/>
           </a:p>
@@ -2925,7 +2931,7 @@
           <a:p>
             <a:fld id="{B0CA4D03-1BCB-4E51-9C66-DF5ED4B532F3}" type="datetimeFigureOut">
               <a:rPr lang="es-PE" smtClean="0"/>
-              <a:t>3/12/2019</a:t>
+              <a:t>20/12/2019</a:t>
             </a:fld>
             <a:endParaRPr lang="es-PE"/>
           </a:p>
@@ -3356,10 +3362,10 @@
         </p:nvGrpSpPr>
         <p:grpSpPr>
           <a:xfrm>
-            <a:off x="384313" y="450524"/>
-            <a:ext cx="11436626" cy="5956952"/>
-            <a:chOff x="384313" y="450524"/>
-            <a:chExt cx="11436626" cy="5956952"/>
+            <a:off x="622852" y="450524"/>
+            <a:ext cx="10681252" cy="6069546"/>
+            <a:chOff x="622852" y="450524"/>
+            <a:chExt cx="10681252" cy="5956952"/>
           </a:xfrm>
         </p:grpSpPr>
         <p:sp>
@@ -3376,12 +3382,18 @@
           </p:nvSpPr>
           <p:spPr>
             <a:xfrm>
-              <a:off x="384313" y="1431437"/>
-              <a:ext cx="11436626" cy="4976039"/>
+              <a:off x="622852" y="1431437"/>
+              <a:ext cx="10681252" cy="4976039"/>
             </a:xfrm>
             <a:prstGeom prst="rect">
               <a:avLst/>
             </a:prstGeom>
+            <a:solidFill>
+              <a:schemeClr val="accent1">
+                <a:lumMod val="60000"/>
+                <a:lumOff val="40000"/>
+              </a:schemeClr>
+            </a:solidFill>
           </p:spPr>
           <p:style>
             <a:lnRef idx="2">
@@ -3420,12 +3432,18 @@
           </p:nvSpPr>
           <p:spPr>
             <a:xfrm>
-              <a:off x="1037761" y="1906519"/>
-              <a:ext cx="10558999" cy="4104873"/>
+              <a:off x="1037762" y="1881889"/>
+              <a:ext cx="9941226" cy="4104873"/>
             </a:xfrm>
             <a:prstGeom prst="rect">
               <a:avLst/>
             </a:prstGeom>
+            <a:solidFill>
+              <a:schemeClr val="accent1">
+                <a:lumMod val="20000"/>
+                <a:lumOff val="80000"/>
+              </a:schemeClr>
+            </a:solidFill>
           </p:spPr>
           <p:style>
             <a:lnRef idx="2">
@@ -3470,6 +3488,9 @@
             <a:prstGeom prst="rect">
               <a:avLst/>
             </a:prstGeom>
+            <a:solidFill>
+              <a:schemeClr val="bg1"/>
+            </a:solidFill>
           </p:spPr>
           <p:style>
             <a:lnRef idx="2">
@@ -3514,6 +3535,12 @@
             <a:prstGeom prst="rect">
               <a:avLst/>
             </a:prstGeom>
+            <a:solidFill>
+              <a:schemeClr val="accent5">
+                <a:lumMod val="60000"/>
+                <a:lumOff val="40000"/>
+              </a:schemeClr>
+            </a:solidFill>
           </p:spPr>
           <p:style>
             <a:lnRef idx="2">
@@ -3577,6 +3604,12 @@
             <a:prstGeom prst="rect">
               <a:avLst/>
             </a:prstGeom>
+            <a:solidFill>
+              <a:schemeClr val="accent5">
+                <a:lumMod val="60000"/>
+                <a:lumOff val="40000"/>
+              </a:schemeClr>
+            </a:solidFill>
           </p:spPr>
           <p:style>
             <a:lnRef idx="2">
@@ -3663,6 +3696,9 @@
             <a:prstGeom prst="rect">
               <a:avLst/>
             </a:prstGeom>
+            <a:solidFill>
+              <a:schemeClr val="bg1"/>
+            </a:solidFill>
           </p:spPr>
           <p:style>
             <a:lnRef idx="2">
@@ -3707,6 +3743,12 @@
             <a:prstGeom prst="rect">
               <a:avLst/>
             </a:prstGeom>
+            <a:solidFill>
+              <a:schemeClr val="accent5">
+                <a:lumMod val="60000"/>
+                <a:lumOff val="40000"/>
+              </a:schemeClr>
+            </a:solidFill>
           </p:spPr>
           <p:style>
             <a:lnRef idx="2">
@@ -3770,6 +3812,12 @@
             <a:prstGeom prst="rect">
               <a:avLst/>
             </a:prstGeom>
+            <a:solidFill>
+              <a:schemeClr val="accent5">
+                <a:lumMod val="60000"/>
+                <a:lumOff val="40000"/>
+              </a:schemeClr>
+            </a:solidFill>
           </p:spPr>
           <p:style>
             <a:lnRef idx="2">
@@ -3864,11 +3912,14 @@
           <p:spPr>
             <a:xfrm>
               <a:off x="8401701" y="2371917"/>
-              <a:ext cx="2570151" cy="3422471"/>
+              <a:ext cx="2333123" cy="3422471"/>
             </a:xfrm>
             <a:prstGeom prst="rect">
               <a:avLst/>
             </a:prstGeom>
+            <a:solidFill>
+              <a:schemeClr val="bg1"/>
+            </a:solidFill>
           </p:spPr>
           <p:style>
             <a:lnRef idx="2">
@@ -3890,7 +3941,15 @@
             <a:p>
               <a:r>
                 <a:rPr lang="es-PE" dirty="0"/>
-                <a:t>Azure Virtual Machine</a:t>
+                <a:t>Azure </a:t>
+              </a:r>
+              <a:r>
+                <a:rPr lang="es-PE" dirty="0" err="1"/>
+                <a:t>MySql</a:t>
+              </a:r>
+              <a:r>
+                <a:rPr lang="es-PE" dirty="0"/>
+                <a:t> </a:t>
               </a:r>
             </a:p>
           </p:txBody>
@@ -3909,12 +3968,18 @@
           </p:nvSpPr>
           <p:spPr>
             <a:xfrm>
-              <a:off x="8945703" y="3321566"/>
+              <a:off x="8741374" y="3172736"/>
               <a:ext cx="1616279" cy="1523177"/>
             </a:xfrm>
             <a:prstGeom prst="can">
               <a:avLst/>
             </a:prstGeom>
+            <a:solidFill>
+              <a:schemeClr val="accent5">
+                <a:lumMod val="60000"/>
+                <a:lumOff val="40000"/>
+              </a:schemeClr>
+            </a:solidFill>
           </p:spPr>
           <p:style>
             <a:lnRef idx="2">
@@ -3937,7 +4002,7 @@
               <a:pPr algn="ctr"/>
               <a:r>
                 <a:rPr lang="es-PE" dirty="0"/>
-                <a:t>Docker/MySQL</a:t>
+                <a:t>MySQL</a:t>
               </a:r>
             </a:p>
           </p:txBody>
@@ -4210,10 +4275,1744 @@
           </p:txBody>
         </p:sp>
       </p:grpSp>
+      <p:sp>
+        <p:nvSpPr>
+          <p:cNvPr id="23" name="CuadroTexto 22">
+            <a:extLst>
+              <a:ext uri="{FF2B5EF4-FFF2-40B4-BE49-F238E27FC236}">
+                <a16:creationId xmlns:a16="http://schemas.microsoft.com/office/drawing/2014/main" id="{FE067867-933D-48B4-B17B-ED058EE6A39B}"/>
+              </a:ext>
+            </a:extLst>
+          </p:cNvPr>
+          <p:cNvSpPr txBox="1"/>
+          <p:nvPr/>
+        </p:nvSpPr>
+        <p:spPr>
+          <a:xfrm>
+            <a:off x="8401701" y="2021545"/>
+            <a:ext cx="1901401" cy="369332"/>
+          </a:xfrm>
+          <a:prstGeom prst="rect">
+            <a:avLst/>
+          </a:prstGeom>
+          <a:noFill/>
+        </p:spPr>
+        <p:txBody>
+          <a:bodyPr wrap="square" rtlCol="0">
+            <a:spAutoFit/>
+          </a:bodyPr>
+          <a:lstStyle/>
+          <a:p>
+            <a:r>
+              <a:rPr lang="es-PE" dirty="0"/>
+              <a:t>Base de Datos</a:t>
+            </a:r>
+          </a:p>
+        </p:txBody>
+      </p:sp>
+      <p:sp>
+        <p:nvSpPr>
+          <p:cNvPr id="24" name="Rectángulo 23">
+            <a:extLst>
+              <a:ext uri="{FF2B5EF4-FFF2-40B4-BE49-F238E27FC236}">
+                <a16:creationId xmlns:a16="http://schemas.microsoft.com/office/drawing/2014/main" id="{032D9B14-C911-4103-A0B7-B304C7792B6B}"/>
+              </a:ext>
+            </a:extLst>
+          </p:cNvPr>
+          <p:cNvSpPr/>
+          <p:nvPr/>
+        </p:nvSpPr>
+        <p:spPr>
+          <a:xfrm>
+            <a:off x="1037760" y="6129765"/>
+            <a:ext cx="9941227" cy="368028"/>
+          </a:xfrm>
+          <a:prstGeom prst="rect">
+            <a:avLst/>
+          </a:prstGeom>
+          <a:solidFill>
+            <a:schemeClr val="accent6">
+              <a:lumMod val="40000"/>
+              <a:lumOff val="60000"/>
+            </a:schemeClr>
+          </a:solidFill>
+        </p:spPr>
+        <p:style>
+          <a:lnRef idx="2">
+            <a:schemeClr val="accent6"/>
+          </a:lnRef>
+          <a:fillRef idx="1">
+            <a:schemeClr val="lt1"/>
+          </a:fillRef>
+          <a:effectRef idx="0">
+            <a:schemeClr val="accent6"/>
+          </a:effectRef>
+          <a:fontRef idx="minor">
+            <a:schemeClr val="dk1"/>
+          </a:fontRef>
+        </p:style>
+        <p:txBody>
+          <a:bodyPr rtlCol="0" anchor="ctr"/>
+          <a:lstStyle/>
+          <a:p>
+            <a:pPr algn="ctr"/>
+            <a:r>
+              <a:rPr lang="es-PE" dirty="0"/>
+              <a:t>Seguridad Azure</a:t>
+            </a:r>
+          </a:p>
+        </p:txBody>
+      </p:sp>
     </p:spTree>
     <p:extLst>
       <p:ext uri="{BB962C8B-B14F-4D97-AF65-F5344CB8AC3E}">
         <p14:creationId xmlns:p14="http://schemas.microsoft.com/office/powerpoint/2010/main" val="166482949"/>
+      </p:ext>
+    </p:extLst>
+  </p:cSld>
+  <p:clrMapOvr>
+    <a:masterClrMapping/>
+  </p:clrMapOvr>
+</p:sld>
+</file>
+
+<file path=ppt/slides/slide2.xml><?xml version="1.0" encoding="utf-8"?>
+<p:sld xmlns:a="http://schemas.openxmlformats.org/drawingml/2006/main" xmlns:r="http://schemas.openxmlformats.org/officeDocument/2006/relationships" xmlns:p="http://schemas.openxmlformats.org/presentationml/2006/main">
+  <p:cSld>
+    <p:spTree>
+      <p:nvGrpSpPr>
+        <p:cNvPr id="1" name=""/>
+        <p:cNvGrpSpPr/>
+        <p:nvPr/>
+      </p:nvGrpSpPr>
+      <p:grpSpPr>
+        <a:xfrm>
+          <a:off x="0" y="0"/>
+          <a:ext cx="0" cy="0"/>
+          <a:chOff x="0" y="0"/>
+          <a:chExt cx="0" cy="0"/>
+        </a:xfrm>
+      </p:grpSpPr>
+      <p:sp>
+        <p:nvSpPr>
+          <p:cNvPr id="18" name="Rectángulo 17">
+            <a:extLst>
+              <a:ext uri="{FF2B5EF4-FFF2-40B4-BE49-F238E27FC236}">
+                <a16:creationId xmlns:a16="http://schemas.microsoft.com/office/drawing/2014/main" id="{EA940E21-4D26-4A8C-84DD-E9B500B3C4DD}"/>
+              </a:ext>
+            </a:extLst>
+          </p:cNvPr>
+          <p:cNvSpPr/>
+          <p:nvPr/>
+        </p:nvSpPr>
+        <p:spPr>
+          <a:xfrm>
+            <a:off x="3484631" y="450524"/>
+            <a:ext cx="6125711" cy="923330"/>
+          </a:xfrm>
+          <a:prstGeom prst="rect">
+            <a:avLst/>
+          </a:prstGeom>
+          <a:noFill/>
+        </p:spPr>
+        <p:txBody>
+          <a:bodyPr wrap="none" lIns="91440" tIns="45720" rIns="91440" bIns="45720">
+            <a:spAutoFit/>
+          </a:bodyPr>
+          <a:lstStyle/>
+          <a:p>
+            <a:pPr algn="ctr"/>
+            <a:r>
+              <a:rPr lang="es-ES" sz="5400" b="0" cap="none" spc="0" dirty="0">
+                <a:ln w="0"/>
+                <a:solidFill>
+                  <a:schemeClr val="accent1"/>
+                </a:solidFill>
+                <a:effectLst>
+                  <a:outerShdw blurRad="38100" dist="25400" dir="5400000" algn="ctr" rotWithShape="0">
+                    <a:srgbClr val="6E747A">
+                      <a:alpha val="43000"/>
+                    </a:srgbClr>
+                  </a:outerShdw>
+                </a:effectLst>
+              </a:rPr>
+              <a:t>Arquitectura Web </a:t>
+            </a:r>
+          </a:p>
+        </p:txBody>
+      </p:sp>
+      <p:grpSp>
+        <p:nvGrpSpPr>
+          <p:cNvPr id="68" name="Grupo 67">
+            <a:extLst>
+              <a:ext uri="{FF2B5EF4-FFF2-40B4-BE49-F238E27FC236}">
+                <a16:creationId xmlns:a16="http://schemas.microsoft.com/office/drawing/2014/main" id="{5232BE96-C647-4DF2-BB18-84D360C39179}"/>
+              </a:ext>
+            </a:extLst>
+          </p:cNvPr>
+          <p:cNvGrpSpPr/>
+          <p:nvPr/>
+        </p:nvGrpSpPr>
+        <p:grpSpPr>
+          <a:xfrm>
+            <a:off x="339599" y="1373854"/>
+            <a:ext cx="11613861" cy="5426563"/>
+            <a:chOff x="583096" y="1431437"/>
+            <a:chExt cx="11512801" cy="5426563"/>
+          </a:xfrm>
+        </p:grpSpPr>
+        <p:sp>
+          <p:nvSpPr>
+            <p:cNvPr id="5" name="Rectángulo 4">
+              <a:extLst>
+                <a:ext uri="{FF2B5EF4-FFF2-40B4-BE49-F238E27FC236}">
+                  <a16:creationId xmlns:a16="http://schemas.microsoft.com/office/drawing/2014/main" id="{E7C06455-D876-46F4-8E74-9A01314BF11C}"/>
+                </a:ext>
+              </a:extLst>
+            </p:cNvPr>
+            <p:cNvSpPr/>
+            <p:nvPr/>
+          </p:nvSpPr>
+          <p:spPr>
+            <a:xfrm>
+              <a:off x="583096" y="1431437"/>
+              <a:ext cx="11512801" cy="5426563"/>
+            </a:xfrm>
+            <a:prstGeom prst="rect">
+              <a:avLst/>
+            </a:prstGeom>
+            <a:solidFill>
+              <a:schemeClr val="accent1">
+                <a:lumMod val="60000"/>
+                <a:lumOff val="40000"/>
+              </a:schemeClr>
+            </a:solidFill>
+          </p:spPr>
+          <p:style>
+            <a:lnRef idx="2">
+              <a:schemeClr val="accent6"/>
+            </a:lnRef>
+            <a:fillRef idx="1">
+              <a:schemeClr val="lt1"/>
+            </a:fillRef>
+            <a:effectRef idx="0">
+              <a:schemeClr val="accent6"/>
+            </a:effectRef>
+            <a:fontRef idx="minor">
+              <a:schemeClr val="dk1"/>
+            </a:fontRef>
+          </p:style>
+          <p:txBody>
+            <a:bodyPr rtlCol="0" anchor="ctr"/>
+            <a:lstStyle/>
+            <a:p>
+              <a:pPr algn="ctr"/>
+              <a:endParaRPr lang="es-PE"/>
+            </a:p>
+          </p:txBody>
+        </p:sp>
+        <p:sp>
+          <p:nvSpPr>
+            <p:cNvPr id="6" name="Rectángulo 5">
+              <a:extLst>
+                <a:ext uri="{FF2B5EF4-FFF2-40B4-BE49-F238E27FC236}">
+                  <a16:creationId xmlns:a16="http://schemas.microsoft.com/office/drawing/2014/main" id="{0A944077-9149-45D1-B6D7-59BA6A758C57}"/>
+                </a:ext>
+              </a:extLst>
+            </p:cNvPr>
+            <p:cNvSpPr/>
+            <p:nvPr/>
+          </p:nvSpPr>
+          <p:spPr>
+            <a:xfrm>
+              <a:off x="744018" y="1893792"/>
+              <a:ext cx="11262730" cy="4387738"/>
+            </a:xfrm>
+            <a:prstGeom prst="rect">
+              <a:avLst/>
+            </a:prstGeom>
+            <a:solidFill>
+              <a:schemeClr val="accent1">
+                <a:lumMod val="20000"/>
+                <a:lumOff val="80000"/>
+              </a:schemeClr>
+            </a:solidFill>
+          </p:spPr>
+          <p:style>
+            <a:lnRef idx="2">
+              <a:schemeClr val="accent6"/>
+            </a:lnRef>
+            <a:fillRef idx="1">
+              <a:schemeClr val="lt1"/>
+            </a:fillRef>
+            <a:effectRef idx="0">
+              <a:schemeClr val="accent6"/>
+            </a:effectRef>
+            <a:fontRef idx="minor">
+              <a:schemeClr val="dk1"/>
+            </a:fontRef>
+          </p:style>
+          <p:txBody>
+            <a:bodyPr rtlCol="0" anchor="ctr"/>
+            <a:lstStyle/>
+            <a:p>
+              <a:pPr algn="ctr"/>
+              <a:endParaRPr lang="es-PE" dirty="0"/>
+            </a:p>
+          </p:txBody>
+        </p:sp>
+        <p:sp>
+          <p:nvSpPr>
+            <p:cNvPr id="10" name="CuadroTexto 9">
+              <a:extLst>
+                <a:ext uri="{FF2B5EF4-FFF2-40B4-BE49-F238E27FC236}">
+                  <a16:creationId xmlns:a16="http://schemas.microsoft.com/office/drawing/2014/main" id="{0C5AE510-1C1F-432E-9BAF-C196CBD38F14}"/>
+                </a:ext>
+              </a:extLst>
+            </p:cNvPr>
+            <p:cNvSpPr txBox="1"/>
+            <p:nvPr/>
+          </p:nvSpPr>
+          <p:spPr>
+            <a:xfrm>
+              <a:off x="2553288" y="2187250"/>
+              <a:ext cx="1242547" cy="369332"/>
+            </a:xfrm>
+            <a:prstGeom prst="rect">
+              <a:avLst/>
+            </a:prstGeom>
+            <a:noFill/>
+          </p:spPr>
+          <p:txBody>
+            <a:bodyPr wrap="square" rtlCol="0">
+              <a:spAutoFit/>
+            </a:bodyPr>
+            <a:lstStyle/>
+            <a:p>
+              <a:r>
+                <a:rPr lang="es-PE" dirty="0" err="1"/>
+                <a:t>FrontEnd</a:t>
+              </a:r>
+              <a:endParaRPr lang="es-PE" dirty="0"/>
+            </a:p>
+          </p:txBody>
+        </p:sp>
+        <p:sp>
+          <p:nvSpPr>
+            <p:cNvPr id="11" name="Rectángulo 10">
+              <a:extLst>
+                <a:ext uri="{FF2B5EF4-FFF2-40B4-BE49-F238E27FC236}">
+                  <a16:creationId xmlns:a16="http://schemas.microsoft.com/office/drawing/2014/main" id="{2D04446D-DC4C-4C33-B4E7-FF9EF5D7A07B}"/>
+                </a:ext>
+              </a:extLst>
+            </p:cNvPr>
+            <p:cNvSpPr/>
+            <p:nvPr/>
+          </p:nvSpPr>
+          <p:spPr>
+            <a:xfrm>
+              <a:off x="6996939" y="2668888"/>
+              <a:ext cx="3187821" cy="2845416"/>
+            </a:xfrm>
+            <a:prstGeom prst="rect">
+              <a:avLst/>
+            </a:prstGeom>
+            <a:solidFill>
+              <a:schemeClr val="accent4">
+                <a:lumMod val="60000"/>
+                <a:lumOff val="40000"/>
+              </a:schemeClr>
+            </a:solidFill>
+          </p:spPr>
+          <p:style>
+            <a:lnRef idx="2">
+              <a:schemeClr val="accent6"/>
+            </a:lnRef>
+            <a:fillRef idx="1">
+              <a:schemeClr val="lt1"/>
+            </a:fillRef>
+            <a:effectRef idx="0">
+              <a:schemeClr val="accent6"/>
+            </a:effectRef>
+            <a:fontRef idx="minor">
+              <a:schemeClr val="dk1"/>
+            </a:fontRef>
+          </p:style>
+          <p:txBody>
+            <a:bodyPr rtlCol="0" anchor="ctr"/>
+            <a:lstStyle/>
+            <a:p>
+              <a:pPr algn="ctr"/>
+              <a:endParaRPr lang="es-PE" dirty="0"/>
+            </a:p>
+          </p:txBody>
+        </p:sp>
+        <p:sp>
+          <p:nvSpPr>
+            <p:cNvPr id="12" name="Rectángulo 11">
+              <a:extLst>
+                <a:ext uri="{FF2B5EF4-FFF2-40B4-BE49-F238E27FC236}">
+                  <a16:creationId xmlns:a16="http://schemas.microsoft.com/office/drawing/2014/main" id="{4CB6EEB5-F07F-49AB-8FAE-892B78AC2DFC}"/>
+                </a:ext>
+              </a:extLst>
+            </p:cNvPr>
+            <p:cNvSpPr/>
+            <p:nvPr/>
+          </p:nvSpPr>
+          <p:spPr>
+            <a:xfrm>
+              <a:off x="9186294" y="3594220"/>
+              <a:ext cx="927272" cy="780671"/>
+            </a:xfrm>
+            <a:prstGeom prst="rect">
+              <a:avLst/>
+            </a:prstGeom>
+          </p:spPr>
+          <p:style>
+            <a:lnRef idx="2">
+              <a:schemeClr val="accent6"/>
+            </a:lnRef>
+            <a:fillRef idx="1">
+              <a:schemeClr val="lt1"/>
+            </a:fillRef>
+            <a:effectRef idx="0">
+              <a:schemeClr val="accent6"/>
+            </a:effectRef>
+            <a:fontRef idx="minor">
+              <a:schemeClr val="dk1"/>
+            </a:fontRef>
+          </p:style>
+          <p:txBody>
+            <a:bodyPr rtlCol="0" anchor="ctr"/>
+            <a:lstStyle/>
+            <a:p>
+              <a:pPr algn="ctr"/>
+              <a:r>
+                <a:rPr lang="es-PE" dirty="0"/>
+                <a:t>Api </a:t>
+              </a:r>
+            </a:p>
+            <a:p>
+              <a:pPr algn="ctr"/>
+              <a:r>
+                <a:rPr lang="es-PE" dirty="0"/>
+                <a:t>Servicio</a:t>
+              </a:r>
+            </a:p>
+          </p:txBody>
+        </p:sp>
+        <p:sp>
+          <p:nvSpPr>
+            <p:cNvPr id="14" name="CuadroTexto 13">
+              <a:extLst>
+                <a:ext uri="{FF2B5EF4-FFF2-40B4-BE49-F238E27FC236}">
+                  <a16:creationId xmlns:a16="http://schemas.microsoft.com/office/drawing/2014/main" id="{F0C166DA-FF73-4F2E-916E-7B61A47A6D27}"/>
+                </a:ext>
+              </a:extLst>
+            </p:cNvPr>
+            <p:cNvSpPr txBox="1"/>
+            <p:nvPr/>
+          </p:nvSpPr>
+          <p:spPr>
+            <a:xfrm>
+              <a:off x="7866589" y="2187250"/>
+              <a:ext cx="1079037" cy="369332"/>
+            </a:xfrm>
+            <a:prstGeom prst="rect">
+              <a:avLst/>
+            </a:prstGeom>
+            <a:noFill/>
+          </p:spPr>
+          <p:txBody>
+            <a:bodyPr wrap="square" rtlCol="0">
+              <a:spAutoFit/>
+            </a:bodyPr>
+            <a:lstStyle/>
+            <a:p>
+              <a:r>
+                <a:rPr lang="es-PE" dirty="0" err="1"/>
+                <a:t>BackEnd</a:t>
+              </a:r>
+              <a:endParaRPr lang="es-PE" dirty="0"/>
+            </a:p>
+          </p:txBody>
+        </p:sp>
+        <p:sp>
+          <p:nvSpPr>
+            <p:cNvPr id="16" name="Cilindro 15">
+              <a:extLst>
+                <a:ext uri="{FF2B5EF4-FFF2-40B4-BE49-F238E27FC236}">
+                  <a16:creationId xmlns:a16="http://schemas.microsoft.com/office/drawing/2014/main" id="{ABA25DD3-80BC-42E3-9BAE-4910298245C7}"/>
+                </a:ext>
+              </a:extLst>
+            </p:cNvPr>
+            <p:cNvSpPr/>
+            <p:nvPr/>
+          </p:nvSpPr>
+          <p:spPr>
+            <a:xfrm>
+              <a:off x="11040831" y="3346876"/>
+              <a:ext cx="859661" cy="1309969"/>
+            </a:xfrm>
+            <a:prstGeom prst="can">
+              <a:avLst>
+                <a:gd name="adj" fmla="val 17091"/>
+              </a:avLst>
+            </a:prstGeom>
+            <a:solidFill>
+              <a:schemeClr val="bg1"/>
+            </a:solidFill>
+          </p:spPr>
+          <p:style>
+            <a:lnRef idx="2">
+              <a:schemeClr val="accent6"/>
+            </a:lnRef>
+            <a:fillRef idx="1">
+              <a:schemeClr val="lt1"/>
+            </a:fillRef>
+            <a:effectRef idx="0">
+              <a:schemeClr val="accent6"/>
+            </a:effectRef>
+            <a:fontRef idx="minor">
+              <a:schemeClr val="dk1"/>
+            </a:fontRef>
+          </p:style>
+          <p:txBody>
+            <a:bodyPr rtlCol="0" anchor="ctr"/>
+            <a:lstStyle/>
+            <a:p>
+              <a:pPr algn="ctr"/>
+              <a:r>
+                <a:rPr lang="es-PE" dirty="0"/>
+                <a:t>MySQL</a:t>
+              </a:r>
+            </a:p>
+          </p:txBody>
+        </p:sp>
+        <p:sp>
+          <p:nvSpPr>
+            <p:cNvPr id="17" name="CuadroTexto 16">
+              <a:extLst>
+                <a:ext uri="{FF2B5EF4-FFF2-40B4-BE49-F238E27FC236}">
+                  <a16:creationId xmlns:a16="http://schemas.microsoft.com/office/drawing/2014/main" id="{472654E2-DF5D-41B1-B126-19132BC38814}"/>
+                </a:ext>
+              </a:extLst>
+            </p:cNvPr>
+            <p:cNvSpPr txBox="1"/>
+            <p:nvPr/>
+          </p:nvSpPr>
+          <p:spPr>
+            <a:xfrm>
+              <a:off x="744018" y="1539678"/>
+              <a:ext cx="2612218" cy="401407"/>
+            </a:xfrm>
+            <a:prstGeom prst="rect">
+              <a:avLst/>
+            </a:prstGeom>
+            <a:noFill/>
+          </p:spPr>
+          <p:txBody>
+            <a:bodyPr wrap="square" rtlCol="0">
+              <a:spAutoFit/>
+            </a:bodyPr>
+            <a:lstStyle/>
+            <a:p>
+              <a:r>
+                <a:rPr lang="es-PE" dirty="0"/>
+                <a:t>Azure Cloud</a:t>
+              </a:r>
+            </a:p>
+          </p:txBody>
+        </p:sp>
+        <p:sp>
+          <p:nvSpPr>
+            <p:cNvPr id="23" name="Rectángulo 22">
+              <a:extLst>
+                <a:ext uri="{FF2B5EF4-FFF2-40B4-BE49-F238E27FC236}">
+                  <a16:creationId xmlns:a16="http://schemas.microsoft.com/office/drawing/2014/main" id="{B2A08371-1AFF-4BCE-8443-2B66B35A2027}"/>
+                </a:ext>
+              </a:extLst>
+            </p:cNvPr>
+            <p:cNvSpPr/>
+            <p:nvPr/>
+          </p:nvSpPr>
+          <p:spPr>
+            <a:xfrm>
+              <a:off x="5367417" y="4374891"/>
+              <a:ext cx="1543481" cy="461748"/>
+            </a:xfrm>
+            <a:prstGeom prst="rect">
+              <a:avLst/>
+            </a:prstGeom>
+          </p:spPr>
+          <p:style>
+            <a:lnRef idx="2">
+              <a:schemeClr val="accent6"/>
+            </a:lnRef>
+            <a:fillRef idx="1">
+              <a:schemeClr val="lt1"/>
+            </a:fillRef>
+            <a:effectRef idx="0">
+              <a:schemeClr val="accent6"/>
+            </a:effectRef>
+            <a:fontRef idx="minor">
+              <a:schemeClr val="dk1"/>
+            </a:fontRef>
+          </p:style>
+          <p:txBody>
+            <a:bodyPr rtlCol="0" anchor="ctr"/>
+            <a:lstStyle/>
+            <a:p>
+              <a:pPr algn="ctr"/>
+              <a:r>
+                <a:rPr lang="es-PE" dirty="0"/>
+                <a:t>JSON Data</a:t>
+              </a:r>
+            </a:p>
+          </p:txBody>
+        </p:sp>
+        <p:sp>
+          <p:nvSpPr>
+            <p:cNvPr id="24" name="Rectángulo 23">
+              <a:extLst>
+                <a:ext uri="{FF2B5EF4-FFF2-40B4-BE49-F238E27FC236}">
+                  <a16:creationId xmlns:a16="http://schemas.microsoft.com/office/drawing/2014/main" id="{1C1BE2B3-5FAC-40E9-9065-4A5CCD905C7E}"/>
+                </a:ext>
+              </a:extLst>
+            </p:cNvPr>
+            <p:cNvSpPr/>
+            <p:nvPr/>
+          </p:nvSpPr>
+          <p:spPr>
+            <a:xfrm>
+              <a:off x="5367418" y="3429000"/>
+              <a:ext cx="1543480" cy="461747"/>
+            </a:xfrm>
+            <a:prstGeom prst="rect">
+              <a:avLst/>
+            </a:prstGeom>
+          </p:spPr>
+          <p:style>
+            <a:lnRef idx="2">
+              <a:schemeClr val="accent6"/>
+            </a:lnRef>
+            <a:fillRef idx="1">
+              <a:schemeClr val="lt1"/>
+            </a:fillRef>
+            <a:effectRef idx="0">
+              <a:schemeClr val="accent6"/>
+            </a:effectRef>
+            <a:fontRef idx="minor">
+              <a:schemeClr val="dk1"/>
+            </a:fontRef>
+          </p:style>
+          <p:txBody>
+            <a:bodyPr rtlCol="0" anchor="ctr"/>
+            <a:lstStyle/>
+            <a:p>
+              <a:pPr algn="ctr"/>
+              <a:r>
+                <a:rPr lang="es-PE" dirty="0"/>
+                <a:t>HTTP </a:t>
+              </a:r>
+              <a:r>
+                <a:rPr lang="es-PE" dirty="0" err="1"/>
+                <a:t>Request</a:t>
+              </a:r>
+              <a:endParaRPr lang="es-PE" dirty="0"/>
+            </a:p>
+          </p:txBody>
+        </p:sp>
+        <p:grpSp>
+          <p:nvGrpSpPr>
+            <p:cNvPr id="50" name="Grupo 49">
+              <a:extLst>
+                <a:ext uri="{FF2B5EF4-FFF2-40B4-BE49-F238E27FC236}">
+                  <a16:creationId xmlns:a16="http://schemas.microsoft.com/office/drawing/2014/main" id="{1FE3A8FA-D112-4BE5-88B5-1ABEB12FCF32}"/>
+                </a:ext>
+              </a:extLst>
+            </p:cNvPr>
+            <p:cNvGrpSpPr/>
+            <p:nvPr/>
+          </p:nvGrpSpPr>
+          <p:grpSpPr>
+            <a:xfrm>
+              <a:off x="3526193" y="2678744"/>
+              <a:ext cx="1685325" cy="2845417"/>
+              <a:chOff x="1885059" y="2945301"/>
+              <a:chExt cx="1685325" cy="2373021"/>
+            </a:xfrm>
+          </p:grpSpPr>
+          <p:sp>
+            <p:nvSpPr>
+              <p:cNvPr id="7" name="Rectángulo 6">
+                <a:extLst>
+                  <a:ext uri="{FF2B5EF4-FFF2-40B4-BE49-F238E27FC236}">
+                    <a16:creationId xmlns:a16="http://schemas.microsoft.com/office/drawing/2014/main" id="{649F36BE-725B-4B35-B798-07DE79B82F93}"/>
+                  </a:ext>
+                </a:extLst>
+              </p:cNvPr>
+              <p:cNvSpPr/>
+              <p:nvPr/>
+            </p:nvSpPr>
+            <p:spPr>
+              <a:xfrm>
+                <a:off x="1885059" y="2945301"/>
+                <a:ext cx="1685325" cy="2373021"/>
+              </a:xfrm>
+              <a:prstGeom prst="rect">
+                <a:avLst/>
+              </a:prstGeom>
+              <a:solidFill>
+                <a:schemeClr val="accent4">
+                  <a:lumMod val="60000"/>
+                  <a:lumOff val="40000"/>
+                </a:schemeClr>
+              </a:solidFill>
+            </p:spPr>
+            <p:style>
+              <a:lnRef idx="2">
+                <a:schemeClr val="accent6"/>
+              </a:lnRef>
+              <a:fillRef idx="1">
+                <a:schemeClr val="lt1"/>
+              </a:fillRef>
+              <a:effectRef idx="0">
+                <a:schemeClr val="accent6"/>
+              </a:effectRef>
+              <a:fontRef idx="minor">
+                <a:schemeClr val="dk1"/>
+              </a:fontRef>
+            </p:style>
+            <p:txBody>
+              <a:bodyPr rtlCol="0" anchor="ctr"/>
+              <a:lstStyle/>
+              <a:p>
+                <a:pPr algn="ctr"/>
+                <a:endParaRPr lang="es-PE" dirty="0"/>
+              </a:p>
+            </p:txBody>
+          </p:sp>
+          <p:sp>
+            <p:nvSpPr>
+              <p:cNvPr id="8" name="Rectángulo 7">
+                <a:extLst>
+                  <a:ext uri="{FF2B5EF4-FFF2-40B4-BE49-F238E27FC236}">
+                    <a16:creationId xmlns:a16="http://schemas.microsoft.com/office/drawing/2014/main" id="{9FB07995-E148-4DB4-A1F0-C7AD4C6EE6D5}"/>
+                  </a:ext>
+                </a:extLst>
+              </p:cNvPr>
+              <p:cNvSpPr/>
+              <p:nvPr/>
+            </p:nvSpPr>
+            <p:spPr>
+              <a:xfrm>
+                <a:off x="1964131" y="3423116"/>
+                <a:ext cx="1520499" cy="367867"/>
+              </a:xfrm>
+              <a:prstGeom prst="rect">
+                <a:avLst/>
+              </a:prstGeom>
+            </p:spPr>
+            <p:style>
+              <a:lnRef idx="2">
+                <a:schemeClr val="accent6"/>
+              </a:lnRef>
+              <a:fillRef idx="1">
+                <a:schemeClr val="lt1"/>
+              </a:fillRef>
+              <a:effectRef idx="0">
+                <a:schemeClr val="accent6"/>
+              </a:effectRef>
+              <a:fontRef idx="minor">
+                <a:schemeClr val="dk1"/>
+              </a:fontRef>
+            </p:style>
+            <p:txBody>
+              <a:bodyPr rtlCol="0" anchor="ctr"/>
+              <a:lstStyle/>
+              <a:p>
+                <a:pPr algn="ctr"/>
+                <a:r>
+                  <a:rPr lang="es-PE" dirty="0"/>
+                  <a:t>Modelo</a:t>
+                </a:r>
+              </a:p>
+            </p:txBody>
+          </p:sp>
+          <p:sp>
+            <p:nvSpPr>
+              <p:cNvPr id="27" name="Rectángulo 26">
+                <a:extLst>
+                  <a:ext uri="{FF2B5EF4-FFF2-40B4-BE49-F238E27FC236}">
+                    <a16:creationId xmlns:a16="http://schemas.microsoft.com/office/drawing/2014/main" id="{BAE3E004-6344-4510-AD7F-277C204A867E}"/>
+                  </a:ext>
+                </a:extLst>
+              </p:cNvPr>
+              <p:cNvSpPr/>
+              <p:nvPr/>
+            </p:nvSpPr>
+            <p:spPr>
+              <a:xfrm>
+                <a:off x="1970103" y="3873568"/>
+                <a:ext cx="1514528" cy="367867"/>
+              </a:xfrm>
+              <a:prstGeom prst="rect">
+                <a:avLst/>
+              </a:prstGeom>
+            </p:spPr>
+            <p:style>
+              <a:lnRef idx="2">
+                <a:schemeClr val="accent6"/>
+              </a:lnRef>
+              <a:fillRef idx="1">
+                <a:schemeClr val="lt1"/>
+              </a:fillRef>
+              <a:effectRef idx="0">
+                <a:schemeClr val="accent6"/>
+              </a:effectRef>
+              <a:fontRef idx="minor">
+                <a:schemeClr val="dk1"/>
+              </a:fontRef>
+            </p:style>
+            <p:txBody>
+              <a:bodyPr rtlCol="0" anchor="ctr"/>
+              <a:lstStyle/>
+              <a:p>
+                <a:pPr algn="ctr"/>
+                <a:r>
+                  <a:rPr lang="es-PE" dirty="0"/>
+                  <a:t>Componente</a:t>
+                </a:r>
+              </a:p>
+            </p:txBody>
+          </p:sp>
+          <p:sp>
+            <p:nvSpPr>
+              <p:cNvPr id="28" name="Rectángulo 27">
+                <a:extLst>
+                  <a:ext uri="{FF2B5EF4-FFF2-40B4-BE49-F238E27FC236}">
+                    <a16:creationId xmlns:a16="http://schemas.microsoft.com/office/drawing/2014/main" id="{9A87505A-0D36-4AF8-BC67-79FBE3ED6F96}"/>
+                  </a:ext>
+                </a:extLst>
+              </p:cNvPr>
+              <p:cNvSpPr/>
+              <p:nvPr/>
+            </p:nvSpPr>
+            <p:spPr>
+              <a:xfrm>
+                <a:off x="1964132" y="4309255"/>
+                <a:ext cx="1514528" cy="367867"/>
+              </a:xfrm>
+              <a:prstGeom prst="rect">
+                <a:avLst/>
+              </a:prstGeom>
+            </p:spPr>
+            <p:style>
+              <a:lnRef idx="2">
+                <a:schemeClr val="accent6"/>
+              </a:lnRef>
+              <a:fillRef idx="1">
+                <a:schemeClr val="lt1"/>
+              </a:fillRef>
+              <a:effectRef idx="0">
+                <a:schemeClr val="accent6"/>
+              </a:effectRef>
+              <a:fontRef idx="minor">
+                <a:schemeClr val="dk1"/>
+              </a:fontRef>
+            </p:style>
+            <p:txBody>
+              <a:bodyPr rtlCol="0" anchor="ctr"/>
+              <a:lstStyle/>
+              <a:p>
+                <a:pPr algn="ctr"/>
+                <a:r>
+                  <a:rPr lang="es-PE" dirty="0"/>
+                  <a:t>Servicio</a:t>
+                </a:r>
+              </a:p>
+            </p:txBody>
+          </p:sp>
+          <p:sp>
+            <p:nvSpPr>
+              <p:cNvPr id="29" name="Rectángulo 28">
+                <a:extLst>
+                  <a:ext uri="{FF2B5EF4-FFF2-40B4-BE49-F238E27FC236}">
+                    <a16:creationId xmlns:a16="http://schemas.microsoft.com/office/drawing/2014/main" id="{A9B6346F-1BD1-448B-98FE-2B145056D396}"/>
+                  </a:ext>
+                </a:extLst>
+              </p:cNvPr>
+              <p:cNvSpPr/>
+              <p:nvPr/>
+            </p:nvSpPr>
+            <p:spPr>
+              <a:xfrm>
+                <a:off x="1964132" y="4744942"/>
+                <a:ext cx="1514528" cy="367867"/>
+              </a:xfrm>
+              <a:prstGeom prst="rect">
+                <a:avLst/>
+              </a:prstGeom>
+            </p:spPr>
+            <p:style>
+              <a:lnRef idx="2">
+                <a:schemeClr val="accent6"/>
+              </a:lnRef>
+              <a:fillRef idx="1">
+                <a:schemeClr val="lt1"/>
+              </a:fillRef>
+              <a:effectRef idx="0">
+                <a:schemeClr val="accent6"/>
+              </a:effectRef>
+              <a:fontRef idx="minor">
+                <a:schemeClr val="dk1"/>
+              </a:fontRef>
+            </p:style>
+            <p:txBody>
+              <a:bodyPr rtlCol="0" anchor="ctr"/>
+              <a:lstStyle/>
+              <a:p>
+                <a:pPr algn="ctr"/>
+                <a:r>
+                  <a:rPr lang="es-PE" dirty="0"/>
+                  <a:t>View</a:t>
+                </a:r>
+              </a:p>
+            </p:txBody>
+          </p:sp>
+          <p:sp>
+            <p:nvSpPr>
+              <p:cNvPr id="30" name="CuadroTexto 29">
+                <a:extLst>
+                  <a:ext uri="{FF2B5EF4-FFF2-40B4-BE49-F238E27FC236}">
+                    <a16:creationId xmlns:a16="http://schemas.microsoft.com/office/drawing/2014/main" id="{57A2082F-2840-4C51-A158-1CDF6B7FB8A3}"/>
+                  </a:ext>
+                </a:extLst>
+              </p:cNvPr>
+              <p:cNvSpPr txBox="1"/>
+              <p:nvPr/>
+            </p:nvSpPr>
+            <p:spPr>
+              <a:xfrm>
+                <a:off x="2248045" y="2972080"/>
+                <a:ext cx="1188949" cy="369332"/>
+              </a:xfrm>
+              <a:prstGeom prst="rect">
+                <a:avLst/>
+              </a:prstGeom>
+              <a:noFill/>
+            </p:spPr>
+            <p:txBody>
+              <a:bodyPr wrap="square" rtlCol="0">
+                <a:spAutoFit/>
+              </a:bodyPr>
+              <a:lstStyle/>
+              <a:p>
+                <a:r>
+                  <a:rPr lang="es-PE" dirty="0"/>
+                  <a:t>Page</a:t>
+                </a:r>
+              </a:p>
+            </p:txBody>
+          </p:sp>
+        </p:grpSp>
+        <p:sp>
+          <p:nvSpPr>
+            <p:cNvPr id="31" name="Rectángulo 30">
+              <a:extLst>
+                <a:ext uri="{FF2B5EF4-FFF2-40B4-BE49-F238E27FC236}">
+                  <a16:creationId xmlns:a16="http://schemas.microsoft.com/office/drawing/2014/main" id="{8F9E14F2-09DB-4908-9167-03681503C70E}"/>
+                </a:ext>
+              </a:extLst>
+            </p:cNvPr>
+            <p:cNvSpPr/>
+            <p:nvPr/>
+          </p:nvSpPr>
+          <p:spPr>
+            <a:xfrm>
+              <a:off x="7090241" y="3659873"/>
+              <a:ext cx="1429771" cy="715018"/>
+            </a:xfrm>
+            <a:prstGeom prst="rect">
+              <a:avLst/>
+            </a:prstGeom>
+          </p:spPr>
+          <p:style>
+            <a:lnRef idx="2">
+              <a:schemeClr val="accent6"/>
+            </a:lnRef>
+            <a:fillRef idx="1">
+              <a:schemeClr val="lt1"/>
+            </a:fillRef>
+            <a:effectRef idx="0">
+              <a:schemeClr val="accent6"/>
+            </a:effectRef>
+            <a:fontRef idx="minor">
+              <a:schemeClr val="dk1"/>
+            </a:fontRef>
+          </p:style>
+          <p:txBody>
+            <a:bodyPr rtlCol="0" anchor="ctr"/>
+            <a:lstStyle/>
+            <a:p>
+              <a:pPr algn="ctr"/>
+              <a:r>
+                <a:rPr lang="es-PE" dirty="0"/>
+                <a:t>Middlewares (</a:t>
+              </a:r>
+              <a:r>
+                <a:rPr lang="es-PE" dirty="0" err="1"/>
+                <a:t>User</a:t>
+              </a:r>
+              <a:r>
+                <a:rPr lang="es-PE" dirty="0"/>
+                <a:t>, Token)</a:t>
+              </a:r>
+            </a:p>
+          </p:txBody>
+        </p:sp>
+        <p:grpSp>
+          <p:nvGrpSpPr>
+            <p:cNvPr id="55" name="Grupo 54">
+              <a:extLst>
+                <a:ext uri="{FF2B5EF4-FFF2-40B4-BE49-F238E27FC236}">
+                  <a16:creationId xmlns:a16="http://schemas.microsoft.com/office/drawing/2014/main" id="{7CC0F735-5627-43F5-A86B-7193B632ABAA}"/>
+                </a:ext>
+              </a:extLst>
+            </p:cNvPr>
+            <p:cNvGrpSpPr/>
+            <p:nvPr/>
+          </p:nvGrpSpPr>
+          <p:grpSpPr>
+            <a:xfrm>
+              <a:off x="1017104" y="2668888"/>
+              <a:ext cx="1771078" cy="2845417"/>
+              <a:chOff x="780636" y="2646634"/>
+              <a:chExt cx="1771078" cy="2845417"/>
+            </a:xfrm>
+          </p:grpSpPr>
+          <p:sp>
+            <p:nvSpPr>
+              <p:cNvPr id="53" name="Rectángulo 52">
+                <a:extLst>
+                  <a:ext uri="{FF2B5EF4-FFF2-40B4-BE49-F238E27FC236}">
+                    <a16:creationId xmlns:a16="http://schemas.microsoft.com/office/drawing/2014/main" id="{5F4AB140-0FC0-4ACB-BEBA-AE8DD075EF58}"/>
+                  </a:ext>
+                </a:extLst>
+              </p:cNvPr>
+              <p:cNvSpPr/>
+              <p:nvPr/>
+            </p:nvSpPr>
+            <p:spPr>
+              <a:xfrm>
+                <a:off x="780636" y="2646634"/>
+                <a:ext cx="1771078" cy="2845417"/>
+              </a:xfrm>
+              <a:prstGeom prst="rect">
+                <a:avLst/>
+              </a:prstGeom>
+              <a:solidFill>
+                <a:schemeClr val="accent4">
+                  <a:lumMod val="60000"/>
+                  <a:lumOff val="40000"/>
+                </a:schemeClr>
+              </a:solidFill>
+            </p:spPr>
+            <p:style>
+              <a:lnRef idx="2">
+                <a:schemeClr val="accent6"/>
+              </a:lnRef>
+              <a:fillRef idx="1">
+                <a:schemeClr val="lt1"/>
+              </a:fillRef>
+              <a:effectRef idx="0">
+                <a:schemeClr val="accent6"/>
+              </a:effectRef>
+              <a:fontRef idx="minor">
+                <a:schemeClr val="dk1"/>
+              </a:fontRef>
+            </p:style>
+            <p:txBody>
+              <a:bodyPr rtlCol="0" anchor="ctr"/>
+              <a:lstStyle/>
+              <a:p>
+                <a:pPr algn="ctr"/>
+                <a:endParaRPr lang="es-PE" dirty="0"/>
+              </a:p>
+            </p:txBody>
+          </p:sp>
+          <p:sp>
+            <p:nvSpPr>
+              <p:cNvPr id="49" name="Rectángulo 48">
+                <a:extLst>
+                  <a:ext uri="{FF2B5EF4-FFF2-40B4-BE49-F238E27FC236}">
+                    <a16:creationId xmlns:a16="http://schemas.microsoft.com/office/drawing/2014/main" id="{D2E2B34A-A706-423F-A3E2-C90E7172B232}"/>
+                  </a:ext>
+                </a:extLst>
+              </p:cNvPr>
+              <p:cNvSpPr/>
+              <p:nvPr/>
+            </p:nvSpPr>
+            <p:spPr>
+              <a:xfrm>
+                <a:off x="865221" y="3801912"/>
+                <a:ext cx="1544124" cy="461747"/>
+              </a:xfrm>
+              <a:prstGeom prst="rect">
+                <a:avLst/>
+              </a:prstGeom>
+            </p:spPr>
+            <p:style>
+              <a:lnRef idx="2">
+                <a:schemeClr val="accent6"/>
+              </a:lnRef>
+              <a:fillRef idx="1">
+                <a:schemeClr val="lt1"/>
+              </a:fillRef>
+              <a:effectRef idx="0">
+                <a:schemeClr val="accent6"/>
+              </a:effectRef>
+              <a:fontRef idx="minor">
+                <a:schemeClr val="dk1"/>
+              </a:fontRef>
+            </p:style>
+            <p:txBody>
+              <a:bodyPr rtlCol="0" anchor="ctr"/>
+              <a:lstStyle/>
+              <a:p>
+                <a:pPr algn="ctr"/>
+                <a:r>
+                  <a:rPr lang="es-PE" dirty="0" err="1"/>
+                  <a:t>Guards</a:t>
+                </a:r>
+                <a:endParaRPr lang="es-PE" dirty="0"/>
+              </a:p>
+            </p:txBody>
+          </p:sp>
+          <p:sp>
+            <p:nvSpPr>
+              <p:cNvPr id="51" name="Diagrama de flujo: disco magnético 50">
+                <a:extLst>
+                  <a:ext uri="{FF2B5EF4-FFF2-40B4-BE49-F238E27FC236}">
+                    <a16:creationId xmlns:a16="http://schemas.microsoft.com/office/drawing/2014/main" id="{030C5644-79B6-4F37-9053-6ADADD798AF9}"/>
+                  </a:ext>
+                </a:extLst>
+              </p:cNvPr>
+              <p:cNvSpPr/>
+              <p:nvPr/>
+            </p:nvSpPr>
+            <p:spPr>
+              <a:xfrm>
+                <a:off x="865221" y="4505809"/>
+                <a:ext cx="1544124" cy="884058"/>
+              </a:xfrm>
+              <a:prstGeom prst="flowChartMagneticDisk">
+                <a:avLst/>
+              </a:prstGeom>
+              <a:solidFill>
+                <a:schemeClr val="bg1"/>
+              </a:solidFill>
+            </p:spPr>
+            <p:style>
+              <a:lnRef idx="2">
+                <a:schemeClr val="accent1">
+                  <a:shade val="50000"/>
+                </a:schemeClr>
+              </a:lnRef>
+              <a:fillRef idx="1">
+                <a:schemeClr val="accent1"/>
+              </a:fillRef>
+              <a:effectRef idx="0">
+                <a:schemeClr val="accent1"/>
+              </a:effectRef>
+              <a:fontRef idx="minor">
+                <a:schemeClr val="lt1"/>
+              </a:fontRef>
+            </p:style>
+            <p:txBody>
+              <a:bodyPr rtlCol="0" anchor="ctr"/>
+              <a:lstStyle/>
+              <a:p>
+                <a:pPr algn="ctr"/>
+                <a:r>
+                  <a:rPr lang="es-PE" dirty="0">
+                    <a:solidFill>
+                      <a:schemeClr val="tx1"/>
+                    </a:solidFill>
+                  </a:rPr>
+                  <a:t>Local</a:t>
+                </a:r>
+                <a:r>
+                  <a:rPr lang="es-PE" dirty="0"/>
+                  <a:t> </a:t>
+                </a:r>
+                <a:r>
+                  <a:rPr lang="es-PE" dirty="0">
+                    <a:solidFill>
+                      <a:schemeClr val="tx1"/>
+                    </a:solidFill>
+                  </a:rPr>
+                  <a:t>Storage (</a:t>
+                </a:r>
+                <a:r>
+                  <a:rPr lang="es-PE" dirty="0" err="1">
+                    <a:solidFill>
+                      <a:schemeClr val="tx1"/>
+                    </a:solidFill>
+                  </a:rPr>
+                  <a:t>User,Token</a:t>
+                </a:r>
+                <a:r>
+                  <a:rPr lang="es-PE" dirty="0"/>
+                  <a:t>)</a:t>
+                </a:r>
+              </a:p>
+            </p:txBody>
+          </p:sp>
+          <p:sp>
+            <p:nvSpPr>
+              <p:cNvPr id="52" name="Rectángulo 51">
+                <a:extLst>
+                  <a:ext uri="{FF2B5EF4-FFF2-40B4-BE49-F238E27FC236}">
+                    <a16:creationId xmlns:a16="http://schemas.microsoft.com/office/drawing/2014/main" id="{BF689DFD-AEFF-4168-BC5F-8A3260B35052}"/>
+                  </a:ext>
+                </a:extLst>
+              </p:cNvPr>
+              <p:cNvSpPr/>
+              <p:nvPr/>
+            </p:nvSpPr>
+            <p:spPr>
+              <a:xfrm>
+                <a:off x="894113" y="3035268"/>
+                <a:ext cx="1544124" cy="461747"/>
+              </a:xfrm>
+              <a:prstGeom prst="rect">
+                <a:avLst/>
+              </a:prstGeom>
+            </p:spPr>
+            <p:style>
+              <a:lnRef idx="2">
+                <a:schemeClr val="accent6"/>
+              </a:lnRef>
+              <a:fillRef idx="1">
+                <a:schemeClr val="lt1"/>
+              </a:fillRef>
+              <a:effectRef idx="0">
+                <a:schemeClr val="accent6"/>
+              </a:effectRef>
+              <a:fontRef idx="minor">
+                <a:schemeClr val="dk1"/>
+              </a:fontRef>
+            </p:style>
+            <p:txBody>
+              <a:bodyPr rtlCol="0" anchor="ctr"/>
+              <a:lstStyle/>
+              <a:p>
+                <a:pPr algn="ctr"/>
+                <a:r>
+                  <a:rPr lang="es-PE" dirty="0" err="1"/>
+                  <a:t>Routes</a:t>
+                </a:r>
+                <a:endParaRPr lang="es-PE" dirty="0"/>
+              </a:p>
+            </p:txBody>
+          </p:sp>
+        </p:grpSp>
+        <p:sp>
+          <p:nvSpPr>
+            <p:cNvPr id="57" name="Flecha: a la derecha 56">
+              <a:extLst>
+                <a:ext uri="{FF2B5EF4-FFF2-40B4-BE49-F238E27FC236}">
+                  <a16:creationId xmlns:a16="http://schemas.microsoft.com/office/drawing/2014/main" id="{2DF8B984-FE82-4244-B290-E152C09195E2}"/>
+                </a:ext>
+              </a:extLst>
+            </p:cNvPr>
+            <p:cNvSpPr/>
+            <p:nvPr/>
+          </p:nvSpPr>
+          <p:spPr>
+            <a:xfrm>
+              <a:off x="5524057" y="3082228"/>
+              <a:ext cx="1052660" cy="230873"/>
+            </a:xfrm>
+            <a:prstGeom prst="rightArrow">
+              <a:avLst/>
+            </a:prstGeom>
+          </p:spPr>
+          <p:style>
+            <a:lnRef idx="2">
+              <a:schemeClr val="accent1">
+                <a:shade val="50000"/>
+              </a:schemeClr>
+            </a:lnRef>
+            <a:fillRef idx="1">
+              <a:schemeClr val="accent1"/>
+            </a:fillRef>
+            <a:effectRef idx="0">
+              <a:schemeClr val="accent1"/>
+            </a:effectRef>
+            <a:fontRef idx="minor">
+              <a:schemeClr val="lt1"/>
+            </a:fontRef>
+          </p:style>
+          <p:txBody>
+            <a:bodyPr rtlCol="0" anchor="ctr"/>
+            <a:lstStyle/>
+            <a:p>
+              <a:pPr algn="ctr"/>
+              <a:endParaRPr lang="es-PE"/>
+            </a:p>
+          </p:txBody>
+        </p:sp>
+        <p:sp>
+          <p:nvSpPr>
+            <p:cNvPr id="58" name="Flecha: a la derecha 57">
+              <a:extLst>
+                <a:ext uri="{FF2B5EF4-FFF2-40B4-BE49-F238E27FC236}">
+                  <a16:creationId xmlns:a16="http://schemas.microsoft.com/office/drawing/2014/main" id="{8A44CAD3-CE1E-46E6-9561-382B162B09A3}"/>
+                </a:ext>
+              </a:extLst>
+            </p:cNvPr>
+            <p:cNvSpPr/>
+            <p:nvPr/>
+          </p:nvSpPr>
+          <p:spPr>
+            <a:xfrm>
+              <a:off x="2875962" y="3761295"/>
+              <a:ext cx="494332" cy="369332"/>
+            </a:xfrm>
+            <a:prstGeom prst="rightArrow">
+              <a:avLst/>
+            </a:prstGeom>
+          </p:spPr>
+          <p:style>
+            <a:lnRef idx="2">
+              <a:schemeClr val="accent1">
+                <a:shade val="50000"/>
+              </a:schemeClr>
+            </a:lnRef>
+            <a:fillRef idx="1">
+              <a:schemeClr val="accent1"/>
+            </a:fillRef>
+            <a:effectRef idx="0">
+              <a:schemeClr val="accent1"/>
+            </a:effectRef>
+            <a:fontRef idx="minor">
+              <a:schemeClr val="lt1"/>
+            </a:fontRef>
+          </p:style>
+          <p:txBody>
+            <a:bodyPr rtlCol="0" anchor="ctr"/>
+            <a:lstStyle/>
+            <a:p>
+              <a:pPr algn="ctr"/>
+              <a:endParaRPr lang="es-PE"/>
+            </a:p>
+          </p:txBody>
+        </p:sp>
+        <p:sp>
+          <p:nvSpPr>
+            <p:cNvPr id="59" name="Flecha: a la derecha 58">
+              <a:extLst>
+                <a:ext uri="{FF2B5EF4-FFF2-40B4-BE49-F238E27FC236}">
+                  <a16:creationId xmlns:a16="http://schemas.microsoft.com/office/drawing/2014/main" id="{3FE85ADC-BFEC-45D0-9E6B-A1909C9E174F}"/>
+                </a:ext>
+              </a:extLst>
+            </p:cNvPr>
+            <p:cNvSpPr/>
+            <p:nvPr/>
+          </p:nvSpPr>
+          <p:spPr>
+            <a:xfrm rot="10800000">
+              <a:off x="5524057" y="4079568"/>
+              <a:ext cx="1052660" cy="230873"/>
+            </a:xfrm>
+            <a:prstGeom prst="rightArrow">
+              <a:avLst/>
+            </a:prstGeom>
+          </p:spPr>
+          <p:style>
+            <a:lnRef idx="2">
+              <a:schemeClr val="accent1">
+                <a:shade val="50000"/>
+              </a:schemeClr>
+            </a:lnRef>
+            <a:fillRef idx="1">
+              <a:schemeClr val="accent1"/>
+            </a:fillRef>
+            <a:effectRef idx="0">
+              <a:schemeClr val="accent1"/>
+            </a:effectRef>
+            <a:fontRef idx="minor">
+              <a:schemeClr val="lt1"/>
+            </a:fontRef>
+          </p:style>
+          <p:txBody>
+            <a:bodyPr rtlCol="0" anchor="ctr"/>
+            <a:lstStyle/>
+            <a:p>
+              <a:pPr algn="ctr"/>
+              <a:endParaRPr lang="es-PE"/>
+            </a:p>
+          </p:txBody>
+        </p:sp>
+        <p:sp>
+          <p:nvSpPr>
+            <p:cNvPr id="60" name="Flecha: a la derecha 59">
+              <a:extLst>
+                <a:ext uri="{FF2B5EF4-FFF2-40B4-BE49-F238E27FC236}">
+                  <a16:creationId xmlns:a16="http://schemas.microsoft.com/office/drawing/2014/main" id="{BEA7B13E-D75D-43DF-BEE5-79BEA4FF247C}"/>
+                </a:ext>
+              </a:extLst>
+            </p:cNvPr>
+            <p:cNvSpPr/>
+            <p:nvPr/>
+          </p:nvSpPr>
+          <p:spPr>
+            <a:xfrm>
+              <a:off x="8590849" y="3802314"/>
+              <a:ext cx="567491" cy="364481"/>
+            </a:xfrm>
+            <a:prstGeom prst="rightArrow">
+              <a:avLst/>
+            </a:prstGeom>
+          </p:spPr>
+          <p:style>
+            <a:lnRef idx="2">
+              <a:schemeClr val="accent1">
+                <a:shade val="50000"/>
+              </a:schemeClr>
+            </a:lnRef>
+            <a:fillRef idx="1">
+              <a:schemeClr val="accent1"/>
+            </a:fillRef>
+            <a:effectRef idx="0">
+              <a:schemeClr val="accent1"/>
+            </a:effectRef>
+            <a:fontRef idx="minor">
+              <a:schemeClr val="lt1"/>
+            </a:fontRef>
+          </p:style>
+          <p:txBody>
+            <a:bodyPr rtlCol="0" anchor="ctr"/>
+            <a:lstStyle/>
+            <a:p>
+              <a:pPr algn="ctr"/>
+              <a:endParaRPr lang="es-PE"/>
+            </a:p>
+          </p:txBody>
+        </p:sp>
+        <p:sp>
+          <p:nvSpPr>
+            <p:cNvPr id="62" name="Flecha: a la derecha 61">
+              <a:extLst>
+                <a:ext uri="{FF2B5EF4-FFF2-40B4-BE49-F238E27FC236}">
+                  <a16:creationId xmlns:a16="http://schemas.microsoft.com/office/drawing/2014/main" id="{98AABFC9-FFB5-4759-9A44-49D146A031E5}"/>
+                </a:ext>
+              </a:extLst>
+            </p:cNvPr>
+            <p:cNvSpPr/>
+            <p:nvPr/>
+          </p:nvSpPr>
+          <p:spPr>
+            <a:xfrm>
+              <a:off x="10450182" y="3725781"/>
+              <a:ext cx="577473" cy="404846"/>
+            </a:xfrm>
+            <a:prstGeom prst="rightArrow">
+              <a:avLst/>
+            </a:prstGeom>
+          </p:spPr>
+          <p:style>
+            <a:lnRef idx="2">
+              <a:schemeClr val="accent1">
+                <a:shade val="50000"/>
+              </a:schemeClr>
+            </a:lnRef>
+            <a:fillRef idx="1">
+              <a:schemeClr val="accent1"/>
+            </a:fillRef>
+            <a:effectRef idx="0">
+              <a:schemeClr val="accent1"/>
+            </a:effectRef>
+            <a:fontRef idx="minor">
+              <a:schemeClr val="lt1"/>
+            </a:fontRef>
+          </p:style>
+          <p:txBody>
+            <a:bodyPr rtlCol="0" anchor="ctr"/>
+            <a:lstStyle/>
+            <a:p>
+              <a:pPr algn="ctr"/>
+              <a:endParaRPr lang="es-PE"/>
+            </a:p>
+          </p:txBody>
+        </p:sp>
+        <p:sp>
+          <p:nvSpPr>
+            <p:cNvPr id="63" name="Rectángulo 62">
+              <a:extLst>
+                <a:ext uri="{FF2B5EF4-FFF2-40B4-BE49-F238E27FC236}">
+                  <a16:creationId xmlns:a16="http://schemas.microsoft.com/office/drawing/2014/main" id="{FD52B77F-2E88-4861-851A-D3DCE420516B}"/>
+                </a:ext>
+              </a:extLst>
+            </p:cNvPr>
+            <p:cNvSpPr/>
+            <p:nvPr/>
+          </p:nvSpPr>
+          <p:spPr>
+            <a:xfrm>
+              <a:off x="1017104" y="5691192"/>
+              <a:ext cx="4194414" cy="550916"/>
+            </a:xfrm>
+            <a:prstGeom prst="rect">
+              <a:avLst/>
+            </a:prstGeom>
+            <a:solidFill>
+              <a:schemeClr val="accent6">
+                <a:lumMod val="40000"/>
+                <a:lumOff val="60000"/>
+              </a:schemeClr>
+            </a:solidFill>
+          </p:spPr>
+          <p:style>
+            <a:lnRef idx="2">
+              <a:schemeClr val="accent6"/>
+            </a:lnRef>
+            <a:fillRef idx="1">
+              <a:schemeClr val="lt1"/>
+            </a:fillRef>
+            <a:effectRef idx="0">
+              <a:schemeClr val="accent6"/>
+            </a:effectRef>
+            <a:fontRef idx="minor">
+              <a:schemeClr val="dk1"/>
+            </a:fontRef>
+          </p:style>
+          <p:txBody>
+            <a:bodyPr rtlCol="0" anchor="ctr"/>
+            <a:lstStyle/>
+            <a:p>
+              <a:pPr algn="ctr"/>
+              <a:r>
+                <a:rPr lang="es-PE" dirty="0" err="1"/>
+                <a:t>AppServices</a:t>
+              </a:r>
+              <a:r>
+                <a:rPr lang="es-PE" dirty="0"/>
+                <a:t> Azure + Docker Container</a:t>
+              </a:r>
+            </a:p>
+          </p:txBody>
+        </p:sp>
+        <p:sp>
+          <p:nvSpPr>
+            <p:cNvPr id="64" name="Rectángulo 63">
+              <a:extLst>
+                <a:ext uri="{FF2B5EF4-FFF2-40B4-BE49-F238E27FC236}">
+                  <a16:creationId xmlns:a16="http://schemas.microsoft.com/office/drawing/2014/main" id="{9571A25D-F00A-4C7B-8A79-02CB215052E9}"/>
+                </a:ext>
+              </a:extLst>
+            </p:cNvPr>
+            <p:cNvSpPr/>
+            <p:nvPr/>
+          </p:nvSpPr>
+          <p:spPr>
+            <a:xfrm>
+              <a:off x="6980484" y="5668986"/>
+              <a:ext cx="3204276" cy="550916"/>
+            </a:xfrm>
+            <a:prstGeom prst="rect">
+              <a:avLst/>
+            </a:prstGeom>
+            <a:solidFill>
+              <a:schemeClr val="accent6">
+                <a:lumMod val="40000"/>
+                <a:lumOff val="60000"/>
+              </a:schemeClr>
+            </a:solidFill>
+          </p:spPr>
+          <p:style>
+            <a:lnRef idx="2">
+              <a:schemeClr val="accent6"/>
+            </a:lnRef>
+            <a:fillRef idx="1">
+              <a:schemeClr val="lt1"/>
+            </a:fillRef>
+            <a:effectRef idx="0">
+              <a:schemeClr val="accent6"/>
+            </a:effectRef>
+            <a:fontRef idx="minor">
+              <a:schemeClr val="dk1"/>
+            </a:fontRef>
+          </p:style>
+          <p:txBody>
+            <a:bodyPr rtlCol="0" anchor="ctr"/>
+            <a:lstStyle/>
+            <a:p>
+              <a:pPr algn="ctr"/>
+              <a:r>
+                <a:rPr lang="es-PE" dirty="0" err="1"/>
+                <a:t>AppServices</a:t>
+              </a:r>
+              <a:r>
+                <a:rPr lang="es-PE" dirty="0"/>
+                <a:t> Azure + Docker Container</a:t>
+              </a:r>
+            </a:p>
+          </p:txBody>
+        </p:sp>
+        <p:sp>
+          <p:nvSpPr>
+            <p:cNvPr id="65" name="Rectángulo 64">
+              <a:extLst>
+                <a:ext uri="{FF2B5EF4-FFF2-40B4-BE49-F238E27FC236}">
+                  <a16:creationId xmlns:a16="http://schemas.microsoft.com/office/drawing/2014/main" id="{9CDBEC43-FBE6-4744-9DFB-7C08817B373A}"/>
+                </a:ext>
+              </a:extLst>
+            </p:cNvPr>
+            <p:cNvSpPr/>
+            <p:nvPr/>
+          </p:nvSpPr>
+          <p:spPr>
+            <a:xfrm>
+              <a:off x="10450181" y="5668985"/>
+              <a:ext cx="1452363" cy="550916"/>
+            </a:xfrm>
+            <a:prstGeom prst="rect">
+              <a:avLst/>
+            </a:prstGeom>
+            <a:solidFill>
+              <a:schemeClr val="accent6">
+                <a:lumMod val="40000"/>
+                <a:lumOff val="60000"/>
+              </a:schemeClr>
+            </a:solidFill>
+          </p:spPr>
+          <p:style>
+            <a:lnRef idx="2">
+              <a:schemeClr val="accent6"/>
+            </a:lnRef>
+            <a:fillRef idx="1">
+              <a:schemeClr val="lt1"/>
+            </a:fillRef>
+            <a:effectRef idx="0">
+              <a:schemeClr val="accent6"/>
+            </a:effectRef>
+            <a:fontRef idx="minor">
+              <a:schemeClr val="dk1"/>
+            </a:fontRef>
+          </p:style>
+          <p:txBody>
+            <a:bodyPr rtlCol="0" anchor="ctr"/>
+            <a:lstStyle/>
+            <a:p>
+              <a:pPr algn="ctr"/>
+              <a:r>
+                <a:rPr lang="es-PE" dirty="0" err="1"/>
+                <a:t>MySql</a:t>
+              </a:r>
+              <a:r>
+                <a:rPr lang="es-PE" dirty="0"/>
+                <a:t> Azure</a:t>
+              </a:r>
+            </a:p>
+          </p:txBody>
+        </p:sp>
+        <p:sp>
+          <p:nvSpPr>
+            <p:cNvPr id="66" name="CuadroTexto 65">
+              <a:extLst>
+                <a:ext uri="{FF2B5EF4-FFF2-40B4-BE49-F238E27FC236}">
+                  <a16:creationId xmlns:a16="http://schemas.microsoft.com/office/drawing/2014/main" id="{A92C1C5B-723D-41F3-A412-C4C9D5CF9D4C}"/>
+                </a:ext>
+              </a:extLst>
+            </p:cNvPr>
+            <p:cNvSpPr txBox="1"/>
+            <p:nvPr/>
+          </p:nvSpPr>
+          <p:spPr>
+            <a:xfrm>
+              <a:off x="1130580" y="2678539"/>
+              <a:ext cx="1618614" cy="369332"/>
+            </a:xfrm>
+            <a:prstGeom prst="rect">
+              <a:avLst/>
+            </a:prstGeom>
+            <a:noFill/>
+          </p:spPr>
+          <p:txBody>
+            <a:bodyPr wrap="square" rtlCol="0">
+              <a:spAutoFit/>
+            </a:bodyPr>
+            <a:lstStyle/>
+            <a:p>
+              <a:r>
+                <a:rPr lang="es-PE" dirty="0"/>
+                <a:t>Autorizaciones</a:t>
+              </a:r>
+            </a:p>
+          </p:txBody>
+        </p:sp>
+        <p:sp>
+          <p:nvSpPr>
+            <p:cNvPr id="67" name="Rectángulo 66">
+              <a:extLst>
+                <a:ext uri="{FF2B5EF4-FFF2-40B4-BE49-F238E27FC236}">
+                  <a16:creationId xmlns:a16="http://schemas.microsoft.com/office/drawing/2014/main" id="{E9ACC628-CAC5-43BB-BA60-7ED194E5A415}"/>
+                </a:ext>
+              </a:extLst>
+            </p:cNvPr>
+            <p:cNvSpPr/>
+            <p:nvPr/>
+          </p:nvSpPr>
+          <p:spPr>
+            <a:xfrm>
+              <a:off x="744017" y="6319861"/>
+              <a:ext cx="11262729" cy="424024"/>
+            </a:xfrm>
+            <a:prstGeom prst="rect">
+              <a:avLst/>
+            </a:prstGeom>
+            <a:solidFill>
+              <a:schemeClr val="accent6">
+                <a:lumMod val="40000"/>
+                <a:lumOff val="60000"/>
+              </a:schemeClr>
+            </a:solidFill>
+          </p:spPr>
+          <p:style>
+            <a:lnRef idx="2">
+              <a:schemeClr val="accent6"/>
+            </a:lnRef>
+            <a:fillRef idx="1">
+              <a:schemeClr val="lt1"/>
+            </a:fillRef>
+            <a:effectRef idx="0">
+              <a:schemeClr val="accent6"/>
+            </a:effectRef>
+            <a:fontRef idx="minor">
+              <a:schemeClr val="dk1"/>
+            </a:fontRef>
+          </p:style>
+          <p:txBody>
+            <a:bodyPr rtlCol="0" anchor="ctr"/>
+            <a:lstStyle/>
+            <a:p>
+              <a:pPr algn="ctr"/>
+              <a:r>
+                <a:rPr lang="es-PE" dirty="0"/>
+                <a:t>Seguridad Azure</a:t>
+              </a:r>
+            </a:p>
+          </p:txBody>
+        </p:sp>
+      </p:grpSp>
+    </p:spTree>
+    <p:extLst>
+      <p:ext uri="{BB962C8B-B14F-4D97-AF65-F5344CB8AC3E}">
+        <p14:creationId xmlns:p14="http://schemas.microsoft.com/office/powerpoint/2010/main" val="788988263"/>
       </p:ext>
     </p:extLst>
   </p:cSld>

</xml_diff>